<commit_message>
Codes are in workable condition
</commit_message>
<xml_diff>
--- a/docs/source/images/SideDBTutorialImages.pptx
+++ b/docs/source/images/SideDBTutorialImages.pptx
@@ -201,7 +201,7 @@
           <a:p>
             <a:fld id="{A461FDD3-2113-0643-91A1-BC41AE7B6247}" type="datetimeFigureOut">
               <a:rPr lang="en-US" smtClean="0"/>
-              <a:t>1/14/20</a:t>
+              <a:t>9/11/20</a:t>
             </a:fld>
             <a:endParaRPr lang="en-US"/>
           </a:p>
@@ -615,7 +615,7 @@
           <a:p>
             <a:fld id="{C7085146-0BF9-7E45-AACD-59CE42CB07C4}" type="datetimeFigureOut">
               <a:rPr lang="en-US" smtClean="0"/>
-              <a:t>1/14/20</a:t>
+              <a:t>9/11/20</a:t>
             </a:fld>
             <a:endParaRPr lang="en-US"/>
           </a:p>
@@ -813,7 +813,7 @@
           <a:p>
             <a:fld id="{C7085146-0BF9-7E45-AACD-59CE42CB07C4}" type="datetimeFigureOut">
               <a:rPr lang="en-US" smtClean="0"/>
-              <a:t>1/14/20</a:t>
+              <a:t>9/11/20</a:t>
             </a:fld>
             <a:endParaRPr lang="en-US"/>
           </a:p>
@@ -1021,7 +1021,7 @@
           <a:p>
             <a:fld id="{C7085146-0BF9-7E45-AACD-59CE42CB07C4}" type="datetimeFigureOut">
               <a:rPr lang="en-US" smtClean="0"/>
-              <a:t>1/14/20</a:t>
+              <a:t>9/11/20</a:t>
             </a:fld>
             <a:endParaRPr lang="en-US"/>
           </a:p>
@@ -1219,7 +1219,7 @@
           <a:p>
             <a:fld id="{C7085146-0BF9-7E45-AACD-59CE42CB07C4}" type="datetimeFigureOut">
               <a:rPr lang="en-US" smtClean="0"/>
-              <a:t>1/14/20</a:t>
+              <a:t>9/11/20</a:t>
             </a:fld>
             <a:endParaRPr lang="en-US"/>
           </a:p>
@@ -1494,7 +1494,7 @@
           <a:p>
             <a:fld id="{C7085146-0BF9-7E45-AACD-59CE42CB07C4}" type="datetimeFigureOut">
               <a:rPr lang="en-US" smtClean="0"/>
-              <a:t>1/14/20</a:t>
+              <a:t>9/11/20</a:t>
             </a:fld>
             <a:endParaRPr lang="en-US"/>
           </a:p>
@@ -1759,7 +1759,7 @@
           <a:p>
             <a:fld id="{C7085146-0BF9-7E45-AACD-59CE42CB07C4}" type="datetimeFigureOut">
               <a:rPr lang="en-US" smtClean="0"/>
-              <a:t>1/14/20</a:t>
+              <a:t>9/11/20</a:t>
             </a:fld>
             <a:endParaRPr lang="en-US"/>
           </a:p>
@@ -2171,7 +2171,7 @@
           <a:p>
             <a:fld id="{C7085146-0BF9-7E45-AACD-59CE42CB07C4}" type="datetimeFigureOut">
               <a:rPr lang="en-US" smtClean="0"/>
-              <a:t>1/14/20</a:t>
+              <a:t>9/11/20</a:t>
             </a:fld>
             <a:endParaRPr lang="en-US"/>
           </a:p>
@@ -2312,7 +2312,7 @@
           <a:p>
             <a:fld id="{C7085146-0BF9-7E45-AACD-59CE42CB07C4}" type="datetimeFigureOut">
               <a:rPr lang="en-US" smtClean="0"/>
-              <a:t>1/14/20</a:t>
+              <a:t>9/11/20</a:t>
             </a:fld>
             <a:endParaRPr lang="en-US"/>
           </a:p>
@@ -2425,7 +2425,7 @@
           <a:p>
             <a:fld id="{C7085146-0BF9-7E45-AACD-59CE42CB07C4}" type="datetimeFigureOut">
               <a:rPr lang="en-US" smtClean="0"/>
-              <a:t>1/14/20</a:t>
+              <a:t>9/11/20</a:t>
             </a:fld>
             <a:endParaRPr lang="en-US"/>
           </a:p>
@@ -2736,7 +2736,7 @@
           <a:p>
             <a:fld id="{C7085146-0BF9-7E45-AACD-59CE42CB07C4}" type="datetimeFigureOut">
               <a:rPr lang="en-US" smtClean="0"/>
-              <a:t>1/14/20</a:t>
+              <a:t>9/11/20</a:t>
             </a:fld>
             <a:endParaRPr lang="en-US"/>
           </a:p>
@@ -3024,7 +3024,7 @@
           <a:p>
             <a:fld id="{C7085146-0BF9-7E45-AACD-59CE42CB07C4}" type="datetimeFigureOut">
               <a:rPr lang="en-US" smtClean="0"/>
-              <a:t>1/14/20</a:t>
+              <a:t>9/11/20</a:t>
             </a:fld>
             <a:endParaRPr lang="en-US"/>
           </a:p>
@@ -3265,7 +3265,7 @@
           <a:p>
             <a:fld id="{C7085146-0BF9-7E45-AACD-59CE42CB07C4}" type="datetimeFigureOut">
               <a:rPr lang="en-US" smtClean="0"/>
-              <a:t>1/14/20</a:t>
+              <a:t>9/11/20</a:t>
             </a:fld>
             <a:endParaRPr lang="en-US"/>
           </a:p>
@@ -7917,7 +7917,7 @@
         </p:nvSpPr>
         <p:spPr>
           <a:xfrm>
-            <a:off x="195262" y="225631"/>
+            <a:off x="195262" y="301475"/>
             <a:ext cx="11801475" cy="6353299"/>
           </a:xfrm>
           <a:prstGeom prst="roundRect">
@@ -7968,641 +7968,1113 @@
           </a:p>
         </p:txBody>
       </p:sp>
-      <p:sp>
-        <p:nvSpPr>
-          <p:cNvPr id="13" name="Shape">
-            <a:extLst>
-              <a:ext uri="{FF2B5EF4-FFF2-40B4-BE49-F238E27FC236}">
-                <a16:creationId xmlns:a16="http://schemas.microsoft.com/office/drawing/2014/main" id="{933723BE-2E9E-6446-929D-6D564C427E66}"/>
-              </a:ext>
-            </a:extLst>
-          </p:cNvPr>
-          <p:cNvSpPr/>
+      <p:grpSp>
+        <p:nvGrpSpPr>
+          <p:cNvPr id="31" name="Group 30">
+            <a:extLst>
+              <a:ext uri="{FF2B5EF4-FFF2-40B4-BE49-F238E27FC236}">
+                <a16:creationId xmlns:a16="http://schemas.microsoft.com/office/drawing/2014/main" id="{F20AB3FC-B8B0-1743-9E17-BF2BC913480E}"/>
+              </a:ext>
+            </a:extLst>
+          </p:cNvPr>
+          <p:cNvGrpSpPr/>
           <p:nvPr/>
-        </p:nvSpPr>
-        <p:spPr>
+        </p:nvGrpSpPr>
+        <p:grpSpPr>
           <a:xfrm>
-            <a:off x="398046" y="1764208"/>
-            <a:ext cx="5000872" cy="4061097"/>
+            <a:off x="622751" y="390303"/>
+            <a:ext cx="10747939" cy="6175642"/>
+            <a:chOff x="622751" y="390303"/>
+            <a:chExt cx="10747939" cy="6175642"/>
           </a:xfrm>
-          <a:custGeom>
-            <a:avLst/>
-            <a:gdLst/>
-            <a:ahLst/>
-            <a:cxnLst>
-              <a:cxn ang="0">
-                <a:pos x="wd2" y="hd2"/>
-              </a:cxn>
-              <a:cxn ang="5400000">
-                <a:pos x="wd2" y="hd2"/>
-              </a:cxn>
-              <a:cxn ang="10800000">
-                <a:pos x="wd2" y="hd2"/>
-              </a:cxn>
-              <a:cxn ang="16200000">
-                <a:pos x="wd2" y="hd2"/>
-              </a:cxn>
-            </a:cxnLst>
-            <a:rect l="0" t="0" r="r" b="b"/>
-            <a:pathLst>
-              <a:path w="21600" h="19255" extrusionOk="0">
-                <a:moveTo>
-                  <a:pt x="0" y="0"/>
-                </a:moveTo>
-                <a:lnTo>
-                  <a:pt x="21600" y="0"/>
-                </a:lnTo>
-                <a:lnTo>
-                  <a:pt x="21600" y="15641"/>
-                </a:lnTo>
-                <a:cubicBezTo>
-                  <a:pt x="10800" y="15641"/>
-                  <a:pt x="10800" y="21600"/>
-                  <a:pt x="0" y="18214"/>
-                </a:cubicBezTo>
-                <a:close/>
-              </a:path>
-            </a:pathLst>
-          </a:custGeom>
-          <a:solidFill>
-            <a:srgbClr val="4C8FCF"/>
-          </a:solidFill>
-          <a:ln w="19050" cap="flat">
+        </p:grpSpPr>
+        <p:sp>
+          <p:nvSpPr>
+            <p:cNvPr id="13" name="Shape">
+              <a:extLst>
+                <a:ext uri="{FF2B5EF4-FFF2-40B4-BE49-F238E27FC236}">
+                  <a16:creationId xmlns:a16="http://schemas.microsoft.com/office/drawing/2014/main" id="{933723BE-2E9E-6446-929D-6D564C427E66}"/>
+                </a:ext>
+              </a:extLst>
+            </p:cNvPr>
+            <p:cNvSpPr/>
+            <p:nvPr/>
+          </p:nvSpPr>
+          <p:spPr>
+            <a:xfrm>
+              <a:off x="622751" y="988377"/>
+              <a:ext cx="5359006" cy="4201457"/>
+            </a:xfrm>
+            <a:custGeom>
+              <a:avLst/>
+              <a:gdLst/>
+              <a:ahLst/>
+              <a:cxnLst>
+                <a:cxn ang="0">
+                  <a:pos x="wd2" y="hd2"/>
+                </a:cxn>
+                <a:cxn ang="5400000">
+                  <a:pos x="wd2" y="hd2"/>
+                </a:cxn>
+                <a:cxn ang="10800000">
+                  <a:pos x="wd2" y="hd2"/>
+                </a:cxn>
+                <a:cxn ang="16200000">
+                  <a:pos x="wd2" y="hd2"/>
+                </a:cxn>
+              </a:cxnLst>
+              <a:rect l="0" t="0" r="r" b="b"/>
+              <a:pathLst>
+                <a:path w="21600" h="19255" extrusionOk="0">
+                  <a:moveTo>
+                    <a:pt x="0" y="0"/>
+                  </a:moveTo>
+                  <a:lnTo>
+                    <a:pt x="21600" y="0"/>
+                  </a:lnTo>
+                  <a:lnTo>
+                    <a:pt x="21600" y="15641"/>
+                  </a:lnTo>
+                  <a:cubicBezTo>
+                    <a:pt x="10800" y="15641"/>
+                    <a:pt x="10800" y="21600"/>
+                    <a:pt x="0" y="18214"/>
+                  </a:cubicBezTo>
+                  <a:close/>
+                </a:path>
+              </a:pathLst>
+            </a:custGeom>
             <a:solidFill>
-              <a:schemeClr val="tx1"/>
+              <a:srgbClr val="4C8FCF"/>
             </a:solidFill>
-            <a:prstDash val="solid"/>
-            <a:miter lim="800000"/>
-          </a:ln>
-          <a:effectLst/>
-        </p:spPr>
-        <p:txBody>
-          <a:bodyPr wrap="square" lIns="45719" tIns="45719" rIns="45719" bIns="45719" numCol="1" anchor="ctr">
-            <a:noAutofit/>
-          </a:bodyPr>
-          <a:lstStyle/>
-          <a:p>
-            <a:pPr algn="ctr">
-              <a:defRPr>
-                <a:solidFill>
-                  <a:srgbClr val="FFFFFF"/>
-                </a:solidFill>
-              </a:defRPr>
-            </a:pPr>
-            <a:endParaRPr sz="800" b="1" dirty="0"/>
-          </a:p>
-        </p:txBody>
-      </p:sp>
-      <p:sp>
-        <p:nvSpPr>
-          <p:cNvPr id="14" name="Can 13">
-            <a:extLst>
-              <a:ext uri="{FF2B5EF4-FFF2-40B4-BE49-F238E27FC236}">
-                <a16:creationId xmlns:a16="http://schemas.microsoft.com/office/drawing/2014/main" id="{EAF82C4F-68D3-5B40-ABC9-6D92EED09902}"/>
-              </a:ext>
-            </a:extLst>
-          </p:cNvPr>
-          <p:cNvSpPr/>
-          <p:nvPr/>
-        </p:nvSpPr>
-        <p:spPr>
-          <a:xfrm>
-            <a:off x="627972" y="1983054"/>
-            <a:ext cx="3065253" cy="646103"/>
-          </a:xfrm>
-          <a:prstGeom prst="can">
-            <a:avLst/>
-          </a:prstGeom>
-          <a:solidFill>
-            <a:schemeClr val="bg1"/>
-          </a:solidFill>
-        </p:spPr>
-        <p:style>
-          <a:lnRef idx="1">
-            <a:schemeClr val="accent1"/>
-          </a:lnRef>
-          <a:fillRef idx="3">
-            <a:schemeClr val="accent1"/>
-          </a:fillRef>
-          <a:effectRef idx="2">
-            <a:schemeClr val="accent1"/>
-          </a:effectRef>
-          <a:fontRef idx="minor">
-            <a:schemeClr val="lt1"/>
-          </a:fontRef>
-        </p:style>
-        <p:txBody>
-          <a:bodyPr rtlCol="0" anchor="ctr"/>
-          <a:lstStyle/>
-          <a:p>
-            <a:pPr algn="ctr"/>
-            <a:r>
-              <a:rPr lang="en-US" u="sng" dirty="0">
+            <a:ln w="19050" cap="flat">
+              <a:solidFill>
+                <a:schemeClr val="tx1"/>
+              </a:solidFill>
+              <a:prstDash val="solid"/>
+              <a:miter lim="800000"/>
+            </a:ln>
+            <a:effectLst/>
+          </p:spPr>
+          <p:txBody>
+            <a:bodyPr wrap="square" lIns="45719" tIns="45719" rIns="45719" bIns="45719" numCol="1" anchor="ctr">
+              <a:noAutofit/>
+            </a:bodyPr>
+            <a:lstStyle/>
+            <a:p>
+              <a:pPr algn="ctr">
+                <a:defRPr>
+                  <a:solidFill>
+                    <a:srgbClr val="FFFFFF"/>
+                  </a:solidFill>
+                </a:defRPr>
+              </a:pPr>
+              <a:endParaRPr sz="800" b="1" dirty="0"/>
+            </a:p>
+          </p:txBody>
+        </p:sp>
+        <p:sp>
+          <p:nvSpPr>
+            <p:cNvPr id="14" name="Can 13">
+              <a:extLst>
+                <a:ext uri="{FF2B5EF4-FFF2-40B4-BE49-F238E27FC236}">
+                  <a16:creationId xmlns:a16="http://schemas.microsoft.com/office/drawing/2014/main" id="{EAF82C4F-68D3-5B40-ABC9-6D92EED09902}"/>
+                </a:ext>
+              </a:extLst>
+            </p:cNvPr>
+            <p:cNvSpPr/>
+            <p:nvPr/>
+          </p:nvSpPr>
+          <p:spPr>
+            <a:xfrm>
+              <a:off x="749192" y="1259664"/>
+              <a:ext cx="3065253" cy="646103"/>
+            </a:xfrm>
+            <a:prstGeom prst="can">
+              <a:avLst/>
+            </a:prstGeom>
+            <a:solidFill>
+              <a:schemeClr val="bg1"/>
+            </a:solidFill>
+          </p:spPr>
+          <p:style>
+            <a:lnRef idx="1">
+              <a:schemeClr val="accent1"/>
+            </a:lnRef>
+            <a:fillRef idx="3">
+              <a:schemeClr val="accent1"/>
+            </a:fillRef>
+            <a:effectRef idx="2">
+              <a:schemeClr val="accent1"/>
+            </a:effectRef>
+            <a:fontRef idx="minor">
+              <a:schemeClr val="lt1"/>
+            </a:fontRef>
+          </p:style>
+          <p:txBody>
+            <a:bodyPr rtlCol="0" anchor="ctr"/>
+            <a:lstStyle/>
+            <a:p>
+              <a:pPr algn="ctr"/>
+              <a:r>
+                <a:rPr lang="en-US" u="sng" dirty="0">
+                  <a:solidFill>
+                    <a:prstClr val="black"/>
+                  </a:solidFill>
+                </a:rPr>
+                <a:t>Public State</a:t>
+              </a:r>
+            </a:p>
+          </p:txBody>
+        </p:sp>
+        <p:sp>
+          <p:nvSpPr>
+            <p:cNvPr id="15" name="Can 14">
+              <a:extLst>
+                <a:ext uri="{FF2B5EF4-FFF2-40B4-BE49-F238E27FC236}">
+                  <a16:creationId xmlns:a16="http://schemas.microsoft.com/office/drawing/2014/main" id="{ECA14428-7967-214B-BE06-ACCF70E31BBE}"/>
+                </a:ext>
+              </a:extLst>
+            </p:cNvPr>
+            <p:cNvSpPr/>
+            <p:nvPr/>
+          </p:nvSpPr>
+          <p:spPr>
+            <a:xfrm>
+              <a:off x="721076" y="2085033"/>
+              <a:ext cx="3121484" cy="1120074"/>
+            </a:xfrm>
+            <a:prstGeom prst="can">
+              <a:avLst/>
+            </a:prstGeom>
+            <a:solidFill>
+              <a:schemeClr val="bg1"/>
+            </a:solidFill>
+          </p:spPr>
+          <p:style>
+            <a:lnRef idx="1">
+              <a:schemeClr val="accent1"/>
+            </a:lnRef>
+            <a:fillRef idx="3">
+              <a:schemeClr val="accent1"/>
+            </a:fillRef>
+            <a:effectRef idx="2">
+              <a:schemeClr val="accent1"/>
+            </a:effectRef>
+            <a:fontRef idx="minor">
+              <a:schemeClr val="lt1"/>
+            </a:fontRef>
+          </p:style>
+          <p:txBody>
+            <a:bodyPr rtlCol="0" anchor="ctr"/>
+            <a:lstStyle/>
+            <a:p>
+              <a:pPr algn="ctr"/>
+              <a:r>
+                <a:rPr lang="en-US" sz="1400" u="sng" dirty="0">
+                  <a:solidFill>
+                    <a:prstClr val="black"/>
+                  </a:solidFill>
+                </a:rPr>
+                <a:t>Private State</a:t>
+              </a:r>
+            </a:p>
+            <a:p>
+              <a:pPr algn="ctr"/>
+              <a:r>
+                <a:rPr lang="en-US" sz="1400" dirty="0">
+                  <a:solidFill>
+                    <a:prstClr val="black"/>
+                  </a:solidFill>
+                </a:rPr>
+                <a:t>Collection: </a:t>
+              </a:r>
+              <a:r>
+                <a:rPr lang="en-US" sz="1400" dirty="0" err="1">
+                  <a:solidFill>
+                    <a:prstClr val="black"/>
+                  </a:solidFill>
+                </a:rPr>
+                <a:t>assetCollection</a:t>
+              </a:r>
+              <a:endParaRPr lang="en-US" sz="1400" dirty="0">
                 <a:solidFill>
                   <a:prstClr val="black"/>
                 </a:solidFill>
-              </a:rPr>
-              <a:t>Public State</a:t>
-            </a:r>
-          </a:p>
-        </p:txBody>
-      </p:sp>
-      <p:sp>
-        <p:nvSpPr>
-          <p:cNvPr id="15" name="Can 14">
-            <a:extLst>
-              <a:ext uri="{FF2B5EF4-FFF2-40B4-BE49-F238E27FC236}">
-                <a16:creationId xmlns:a16="http://schemas.microsoft.com/office/drawing/2014/main" id="{ECA14428-7967-214B-BE06-ACCF70E31BBE}"/>
-              </a:ext>
-            </a:extLst>
-          </p:cNvPr>
-          <p:cNvSpPr/>
-          <p:nvPr/>
-        </p:nvSpPr>
-        <p:spPr>
-          <a:xfrm>
-            <a:off x="571742" y="2839793"/>
-            <a:ext cx="3121484" cy="1120074"/>
-          </a:xfrm>
-          <a:prstGeom prst="can">
-            <a:avLst/>
-          </a:prstGeom>
-          <a:solidFill>
-            <a:schemeClr val="bg1"/>
-          </a:solidFill>
-        </p:spPr>
-        <p:style>
-          <a:lnRef idx="1">
-            <a:schemeClr val="accent1"/>
-          </a:lnRef>
-          <a:fillRef idx="3">
-            <a:schemeClr val="accent1"/>
-          </a:fillRef>
-          <a:effectRef idx="2">
-            <a:schemeClr val="accent1"/>
-          </a:effectRef>
-          <a:fontRef idx="minor">
-            <a:schemeClr val="lt1"/>
-          </a:fontRef>
-        </p:style>
-        <p:txBody>
-          <a:bodyPr rtlCol="0" anchor="ctr"/>
-          <a:lstStyle/>
-          <a:p>
-            <a:pPr algn="ctr"/>
-            <a:r>
-              <a:rPr lang="en-US" u="sng" dirty="0">
+              </a:endParaRPr>
+            </a:p>
+            <a:p>
+              <a:pPr algn="ctr"/>
+              <a:r>
+                <a:rPr lang="en-US" sz="1400" dirty="0">
+                  <a:solidFill>
+                    <a:schemeClr val="tx1"/>
+                  </a:solidFill>
+                </a:rPr>
+                <a:t>ID, color, size, owner</a:t>
+              </a:r>
+            </a:p>
+          </p:txBody>
+        </p:sp>
+        <p:sp>
+          <p:nvSpPr>
+            <p:cNvPr id="16" name="Can 15">
+              <a:extLst>
+                <a:ext uri="{FF2B5EF4-FFF2-40B4-BE49-F238E27FC236}">
+                  <a16:creationId xmlns:a16="http://schemas.microsoft.com/office/drawing/2014/main" id="{06F0C01B-57F2-A441-8868-36A65EE11FC0}"/>
+                </a:ext>
+              </a:extLst>
+            </p:cNvPr>
+            <p:cNvSpPr/>
+            <p:nvPr/>
+          </p:nvSpPr>
+          <p:spPr>
+            <a:xfrm>
+              <a:off x="788468" y="3328900"/>
+              <a:ext cx="3123216" cy="1229649"/>
+            </a:xfrm>
+            <a:prstGeom prst="can">
+              <a:avLst/>
+            </a:prstGeom>
+            <a:solidFill>
+              <a:schemeClr val="bg1"/>
+            </a:solidFill>
+          </p:spPr>
+          <p:style>
+            <a:lnRef idx="1">
+              <a:schemeClr val="accent1"/>
+            </a:lnRef>
+            <a:fillRef idx="3">
+              <a:schemeClr val="accent1"/>
+            </a:fillRef>
+            <a:effectRef idx="2">
+              <a:schemeClr val="accent1"/>
+            </a:effectRef>
+            <a:fontRef idx="minor">
+              <a:schemeClr val="lt1"/>
+            </a:fontRef>
+          </p:style>
+          <p:txBody>
+            <a:bodyPr rtlCol="0" anchor="ctr"/>
+            <a:lstStyle/>
+            <a:p>
+              <a:pPr algn="ctr"/>
+              <a:endParaRPr lang="en-US" sz="1600" u="sng" dirty="0">
                 <a:solidFill>
                   <a:prstClr val="black"/>
                 </a:solidFill>
-              </a:rPr>
-              <a:t>Private State</a:t>
-            </a:r>
-          </a:p>
-          <a:p>
-            <a:pPr algn="ctr"/>
-            <a:r>
-              <a:rPr lang="en-US" dirty="0">
+              </a:endParaRPr>
+            </a:p>
+            <a:p>
+              <a:pPr algn="ctr"/>
+              <a:r>
+                <a:rPr lang="en-US" sz="1400" u="sng" dirty="0">
+                  <a:solidFill>
+                    <a:prstClr val="black"/>
+                  </a:solidFill>
+                </a:rPr>
+                <a:t>Private State</a:t>
+              </a:r>
+            </a:p>
+            <a:p>
+              <a:pPr algn="ctr"/>
+              <a:r>
+                <a:rPr lang="en-US" sz="1400" dirty="0">
+                  <a:solidFill>
+                    <a:schemeClr val="tx1"/>
+                  </a:solidFill>
+                </a:rPr>
+                <a:t>Collection: Org1MSPPrivateCollection</a:t>
+              </a:r>
+            </a:p>
+            <a:p>
+              <a:pPr algn="ctr"/>
+              <a:r>
+                <a:rPr lang="en-US" sz="1400" dirty="0" err="1">
+                  <a:solidFill>
+                    <a:schemeClr val="tx1"/>
+                  </a:solidFill>
+                </a:rPr>
+                <a:t>appraisedValue</a:t>
+              </a:r>
+              <a:endParaRPr lang="en-US" sz="1400" dirty="0">
+                <a:solidFill>
+                  <a:schemeClr val="tx1"/>
+                </a:solidFill>
+              </a:endParaRPr>
+            </a:p>
+            <a:p>
+              <a:pPr algn="ctr"/>
+              <a:endParaRPr lang="en-US" sz="1000" u="sng" dirty="0">
                 <a:solidFill>
                   <a:prstClr val="black"/>
                 </a:solidFill>
-              </a:rPr>
-              <a:t>Collection: Marbles</a:t>
-            </a:r>
-          </a:p>
-          <a:p>
-            <a:pPr algn="ctr"/>
-            <a:r>
-              <a:rPr lang="en-US" dirty="0">
+              </a:endParaRPr>
+            </a:p>
+          </p:txBody>
+        </p:sp>
+        <p:sp>
+          <p:nvSpPr>
+            <p:cNvPr id="9" name="Rounded Rectangle 8">
+              <a:extLst>
+                <a:ext uri="{FF2B5EF4-FFF2-40B4-BE49-F238E27FC236}">
+                  <a16:creationId xmlns:a16="http://schemas.microsoft.com/office/drawing/2014/main" id="{E84BB631-FB0B-BC47-AF70-B605E3FB7DCD}"/>
+                </a:ext>
+              </a:extLst>
+            </p:cNvPr>
+            <p:cNvSpPr/>
+            <p:nvPr/>
+          </p:nvSpPr>
+          <p:spPr>
+            <a:xfrm>
+              <a:off x="4383610" y="390303"/>
+              <a:ext cx="1568219" cy="1463025"/>
+            </a:xfrm>
+            <a:prstGeom prst="roundRect">
+              <a:avLst/>
+            </a:prstGeom>
+            <a:solidFill>
+              <a:srgbClr val="4C8FCF"/>
+            </a:solidFill>
+            <a:ln w="28575" cap="flat">
+              <a:solidFill>
+                <a:schemeClr val="tx1"/>
+              </a:solidFill>
+              <a:prstDash val="solid"/>
+              <a:miter lim="800000"/>
+            </a:ln>
+            <a:effectLst/>
+          </p:spPr>
+          <p:txBody>
+            <a:bodyPr wrap="square" lIns="45719" tIns="45719" rIns="45719" bIns="45719" numCol="1" anchor="ctr">
+              <a:noAutofit/>
+            </a:bodyPr>
+            <a:lstStyle/>
+            <a:p>
+              <a:pPr algn="ctr"/>
+              <a:r>
+                <a:rPr lang="en-US" sz="3600" b="1" dirty="0">
+                  <a:solidFill>
+                    <a:srgbClr val="FFFFFF"/>
+                  </a:solidFill>
+                </a:rPr>
+                <a:t>Org1 peer</a:t>
+              </a:r>
+            </a:p>
+          </p:txBody>
+        </p:sp>
+        <p:sp>
+          <p:nvSpPr>
+            <p:cNvPr id="30" name="Shape">
+              <a:extLst>
+                <a:ext uri="{FF2B5EF4-FFF2-40B4-BE49-F238E27FC236}">
+                  <a16:creationId xmlns:a16="http://schemas.microsoft.com/office/drawing/2014/main" id="{0B540093-0398-EC44-831A-E17D34724EA1}"/>
+                </a:ext>
+              </a:extLst>
+            </p:cNvPr>
+            <p:cNvSpPr/>
+            <p:nvPr/>
+          </p:nvSpPr>
+          <p:spPr>
+            <a:xfrm>
+              <a:off x="6011684" y="988377"/>
+              <a:ext cx="5359006" cy="4061097"/>
+            </a:xfrm>
+            <a:custGeom>
+              <a:avLst/>
+              <a:gdLst/>
+              <a:ahLst/>
+              <a:cxnLst>
+                <a:cxn ang="0">
+                  <a:pos x="wd2" y="hd2"/>
+                </a:cxn>
+                <a:cxn ang="5400000">
+                  <a:pos x="wd2" y="hd2"/>
+                </a:cxn>
+                <a:cxn ang="10800000">
+                  <a:pos x="wd2" y="hd2"/>
+                </a:cxn>
+                <a:cxn ang="16200000">
+                  <a:pos x="wd2" y="hd2"/>
+                </a:cxn>
+              </a:cxnLst>
+              <a:rect l="0" t="0" r="r" b="b"/>
+              <a:pathLst>
+                <a:path w="21600" h="19255" extrusionOk="0">
+                  <a:moveTo>
+                    <a:pt x="0" y="0"/>
+                  </a:moveTo>
+                  <a:lnTo>
+                    <a:pt x="21600" y="0"/>
+                  </a:lnTo>
+                  <a:lnTo>
+                    <a:pt x="21600" y="15641"/>
+                  </a:lnTo>
+                  <a:cubicBezTo>
+                    <a:pt x="10800" y="15641"/>
+                    <a:pt x="10800" y="21600"/>
+                    <a:pt x="0" y="18214"/>
+                  </a:cubicBezTo>
+                  <a:close/>
+                </a:path>
+              </a:pathLst>
+            </a:custGeom>
+            <a:solidFill>
+              <a:srgbClr val="4C8FCF"/>
+            </a:solidFill>
+            <a:ln w="19050" cap="flat">
+              <a:solidFill>
+                <a:schemeClr val="tx1"/>
+              </a:solidFill>
+              <a:prstDash val="solid"/>
+              <a:miter lim="800000"/>
+            </a:ln>
+            <a:effectLst/>
+          </p:spPr>
+          <p:txBody>
+            <a:bodyPr wrap="square" lIns="45719" tIns="45719" rIns="45719" bIns="45719" numCol="1" anchor="ctr">
+              <a:noAutofit/>
+            </a:bodyPr>
+            <a:lstStyle/>
+            <a:p>
+              <a:pPr algn="ctr">
+                <a:defRPr>
+                  <a:solidFill>
+                    <a:srgbClr val="FFFFFF"/>
+                  </a:solidFill>
+                </a:defRPr>
+              </a:pPr>
+              <a:endParaRPr sz="800" b="1" dirty="0"/>
+            </a:p>
+          </p:txBody>
+        </p:sp>
+        <p:sp>
+          <p:nvSpPr>
+            <p:cNvPr id="33" name="Rounded Rectangle 32">
+              <a:extLst>
+                <a:ext uri="{FF2B5EF4-FFF2-40B4-BE49-F238E27FC236}">
+                  <a16:creationId xmlns:a16="http://schemas.microsoft.com/office/drawing/2014/main" id="{9D568330-ED85-654A-A281-3914D288A159}"/>
+                </a:ext>
+              </a:extLst>
+            </p:cNvPr>
+            <p:cNvSpPr/>
+            <p:nvPr/>
+          </p:nvSpPr>
+          <p:spPr>
+            <a:xfrm>
+              <a:off x="9802471" y="392701"/>
+              <a:ext cx="1568219" cy="1463025"/>
+            </a:xfrm>
+            <a:prstGeom prst="roundRect">
+              <a:avLst/>
+            </a:prstGeom>
+            <a:solidFill>
+              <a:srgbClr val="4C8FCF"/>
+            </a:solidFill>
+            <a:ln w="28575" cap="flat">
+              <a:solidFill>
+                <a:schemeClr val="tx1"/>
+              </a:solidFill>
+              <a:prstDash val="solid"/>
+              <a:miter lim="800000"/>
+            </a:ln>
+            <a:effectLst/>
+          </p:spPr>
+          <p:txBody>
+            <a:bodyPr wrap="square" lIns="45719" tIns="45719" rIns="45719" bIns="45719" numCol="1" anchor="ctr">
+              <a:noAutofit/>
+            </a:bodyPr>
+            <a:lstStyle/>
+            <a:p>
+              <a:pPr algn="ctr"/>
+              <a:r>
+                <a:rPr lang="en-US" sz="3600" b="1" dirty="0">
+                  <a:solidFill>
+                    <a:srgbClr val="FFFFFF"/>
+                  </a:solidFill>
+                </a:rPr>
+                <a:t>Org2 peer</a:t>
+              </a:r>
+            </a:p>
+          </p:txBody>
+        </p:sp>
+        <p:sp>
+          <p:nvSpPr>
+            <p:cNvPr id="36" name="Can 35">
+              <a:extLst>
+                <a:ext uri="{FF2B5EF4-FFF2-40B4-BE49-F238E27FC236}">
+                  <a16:creationId xmlns:a16="http://schemas.microsoft.com/office/drawing/2014/main" id="{41E049EF-171C-AC41-89E0-CD9841F8851E}"/>
+                </a:ext>
+              </a:extLst>
+            </p:cNvPr>
+            <p:cNvSpPr/>
+            <p:nvPr/>
+          </p:nvSpPr>
+          <p:spPr>
+            <a:xfrm>
+              <a:off x="6154856" y="1259663"/>
+              <a:ext cx="3065253" cy="646103"/>
+            </a:xfrm>
+            <a:prstGeom prst="can">
+              <a:avLst/>
+            </a:prstGeom>
+            <a:solidFill>
+              <a:schemeClr val="bg1"/>
+            </a:solidFill>
+          </p:spPr>
+          <p:style>
+            <a:lnRef idx="1">
+              <a:schemeClr val="accent1"/>
+            </a:lnRef>
+            <a:fillRef idx="3">
+              <a:schemeClr val="accent1"/>
+            </a:fillRef>
+            <a:effectRef idx="2">
+              <a:schemeClr val="accent1"/>
+            </a:effectRef>
+            <a:fontRef idx="minor">
+              <a:schemeClr val="lt1"/>
+            </a:fontRef>
+          </p:style>
+          <p:txBody>
+            <a:bodyPr rtlCol="0" anchor="ctr"/>
+            <a:lstStyle/>
+            <a:p>
+              <a:pPr algn="ctr"/>
+              <a:r>
+                <a:rPr lang="en-US" u="sng" dirty="0">
+                  <a:solidFill>
+                    <a:prstClr val="black"/>
+                  </a:solidFill>
+                </a:rPr>
+                <a:t>Public State</a:t>
+              </a:r>
+            </a:p>
+          </p:txBody>
+        </p:sp>
+        <p:sp>
+          <p:nvSpPr>
+            <p:cNvPr id="37" name="Can 36">
+              <a:extLst>
+                <a:ext uri="{FF2B5EF4-FFF2-40B4-BE49-F238E27FC236}">
+                  <a16:creationId xmlns:a16="http://schemas.microsoft.com/office/drawing/2014/main" id="{2DD1FDE6-9D9E-A843-88F5-F53B2C35F595}"/>
+                </a:ext>
+              </a:extLst>
+            </p:cNvPr>
+            <p:cNvSpPr/>
+            <p:nvPr/>
+          </p:nvSpPr>
+          <p:spPr>
+            <a:xfrm>
+              <a:off x="6141228" y="2081672"/>
+              <a:ext cx="3121484" cy="1120074"/>
+            </a:xfrm>
+            <a:prstGeom prst="can">
+              <a:avLst/>
+            </a:prstGeom>
+            <a:solidFill>
+              <a:schemeClr val="bg1"/>
+            </a:solidFill>
+          </p:spPr>
+          <p:style>
+            <a:lnRef idx="1">
+              <a:schemeClr val="accent1"/>
+            </a:lnRef>
+            <a:fillRef idx="3">
+              <a:schemeClr val="accent1"/>
+            </a:fillRef>
+            <a:effectRef idx="2">
+              <a:schemeClr val="accent1"/>
+            </a:effectRef>
+            <a:fontRef idx="minor">
+              <a:schemeClr val="lt1"/>
+            </a:fontRef>
+          </p:style>
+          <p:txBody>
+            <a:bodyPr rtlCol="0" anchor="ctr"/>
+            <a:lstStyle/>
+            <a:p>
+              <a:pPr algn="ctr"/>
+              <a:r>
+                <a:rPr lang="en-US" sz="1400" u="sng" dirty="0">
+                  <a:solidFill>
+                    <a:prstClr val="black"/>
+                  </a:solidFill>
+                </a:rPr>
+                <a:t>Private State</a:t>
+              </a:r>
+            </a:p>
+            <a:p>
+              <a:pPr algn="ctr"/>
+              <a:r>
+                <a:rPr lang="en-US" sz="1400" dirty="0">
+                  <a:solidFill>
+                    <a:prstClr val="black"/>
+                  </a:solidFill>
+                </a:rPr>
+                <a:t>Collection: </a:t>
+              </a:r>
+              <a:r>
+                <a:rPr lang="en-US" sz="1400" dirty="0" err="1">
+                  <a:solidFill>
+                    <a:prstClr val="black"/>
+                  </a:solidFill>
+                </a:rPr>
+                <a:t>assetCollection</a:t>
+              </a:r>
+              <a:endParaRPr lang="en-US" sz="1400" dirty="0">
+                <a:solidFill>
+                  <a:prstClr val="black"/>
+                </a:solidFill>
+              </a:endParaRPr>
+            </a:p>
+            <a:p>
+              <a:pPr algn="ctr"/>
+              <a:r>
+                <a:rPr lang="en-US" sz="1400" dirty="0">
+                  <a:solidFill>
+                    <a:schemeClr val="tx1"/>
+                  </a:solidFill>
+                </a:rPr>
+                <a:t>ID, color, size, owner</a:t>
+              </a:r>
+            </a:p>
+          </p:txBody>
+        </p:sp>
+        <p:sp>
+          <p:nvSpPr>
+            <p:cNvPr id="12" name="Can 11">
+              <a:extLst>
+                <a:ext uri="{FF2B5EF4-FFF2-40B4-BE49-F238E27FC236}">
+                  <a16:creationId xmlns:a16="http://schemas.microsoft.com/office/drawing/2014/main" id="{8D741447-BEE4-B44E-BA72-6C1EB6776663}"/>
+                </a:ext>
+              </a:extLst>
+            </p:cNvPr>
+            <p:cNvSpPr/>
+            <p:nvPr/>
+          </p:nvSpPr>
+          <p:spPr>
+            <a:xfrm>
+              <a:off x="6171155" y="3328899"/>
+              <a:ext cx="3121484" cy="1229649"/>
+            </a:xfrm>
+            <a:prstGeom prst="can">
+              <a:avLst/>
+            </a:prstGeom>
+            <a:solidFill>
+              <a:schemeClr val="bg1"/>
+            </a:solidFill>
+          </p:spPr>
+          <p:style>
+            <a:lnRef idx="1">
+              <a:schemeClr val="accent1"/>
+            </a:lnRef>
+            <a:fillRef idx="3">
+              <a:schemeClr val="accent1"/>
+            </a:fillRef>
+            <a:effectRef idx="2">
+              <a:schemeClr val="accent1"/>
+            </a:effectRef>
+            <a:fontRef idx="minor">
+              <a:schemeClr val="lt1"/>
+            </a:fontRef>
+          </p:style>
+          <p:txBody>
+            <a:bodyPr rtlCol="0" anchor="ctr"/>
+            <a:lstStyle/>
+            <a:p>
+              <a:pPr algn="ctr"/>
+              <a:endParaRPr lang="en-US" sz="1600" u="sng" dirty="0">
+                <a:solidFill>
+                  <a:prstClr val="black"/>
+                </a:solidFill>
+              </a:endParaRPr>
+            </a:p>
+            <a:p>
+              <a:pPr algn="ctr"/>
+              <a:r>
+                <a:rPr lang="en-US" sz="1400" u="sng" dirty="0">
+                  <a:solidFill>
+                    <a:prstClr val="black"/>
+                  </a:solidFill>
+                </a:rPr>
+                <a:t>Private State</a:t>
+              </a:r>
+            </a:p>
+            <a:p>
+              <a:pPr algn="ctr"/>
+              <a:r>
+                <a:rPr lang="en-US" sz="1400" dirty="0">
+                  <a:solidFill>
+                    <a:schemeClr val="tx1"/>
+                  </a:solidFill>
+                </a:rPr>
+                <a:t>Collection: Org2MSPPrivateCollection</a:t>
+              </a:r>
+            </a:p>
+            <a:p>
+              <a:pPr algn="ctr"/>
+              <a:r>
+                <a:rPr lang="en-US" sz="1400" dirty="0" err="1">
+                  <a:solidFill>
+                    <a:schemeClr val="tx1"/>
+                  </a:solidFill>
+                </a:rPr>
+                <a:t>appraisedValue</a:t>
+              </a:r>
+              <a:endParaRPr lang="en-US" sz="1400" dirty="0">
                 <a:solidFill>
                   <a:schemeClr val="tx1"/>
                 </a:solidFill>
-              </a:rPr>
-              <a:t>name, color, size, owner</a:t>
-            </a:r>
-          </a:p>
-        </p:txBody>
-      </p:sp>
-      <p:sp>
-        <p:nvSpPr>
-          <p:cNvPr id="16" name="Can 15">
-            <a:extLst>
-              <a:ext uri="{FF2B5EF4-FFF2-40B4-BE49-F238E27FC236}">
-                <a16:creationId xmlns:a16="http://schemas.microsoft.com/office/drawing/2014/main" id="{06F0C01B-57F2-A441-8868-36A65EE11FC0}"/>
-              </a:ext>
-            </a:extLst>
-          </p:cNvPr>
-          <p:cNvSpPr/>
-          <p:nvPr/>
-        </p:nvSpPr>
-        <p:spPr>
-          <a:xfrm>
-            <a:off x="570010" y="3959867"/>
-            <a:ext cx="3123216" cy="1229649"/>
-          </a:xfrm>
-          <a:prstGeom prst="can">
-            <a:avLst/>
-          </a:prstGeom>
-          <a:solidFill>
-            <a:schemeClr val="bg1"/>
-          </a:solidFill>
-        </p:spPr>
-        <p:style>
-          <a:lnRef idx="1">
-            <a:schemeClr val="accent1"/>
-          </a:lnRef>
-          <a:fillRef idx="3">
-            <a:schemeClr val="accent1"/>
-          </a:fillRef>
-          <a:effectRef idx="2">
-            <a:schemeClr val="accent1"/>
-          </a:effectRef>
-          <a:fontRef idx="minor">
-            <a:schemeClr val="lt1"/>
-          </a:fontRef>
-        </p:style>
-        <p:txBody>
-          <a:bodyPr rtlCol="0" anchor="ctr"/>
-          <a:lstStyle/>
-          <a:p>
-            <a:pPr algn="ctr"/>
-            <a:endParaRPr lang="en-US" sz="1600" u="sng" dirty="0">
-              <a:solidFill>
-                <a:prstClr val="black"/>
-              </a:solidFill>
-            </a:endParaRPr>
-          </a:p>
-          <a:p>
-            <a:pPr algn="ctr"/>
-            <a:r>
-              <a:rPr lang="en-US" u="sng" dirty="0">
+              </a:endParaRPr>
+            </a:p>
+            <a:p>
+              <a:pPr algn="ctr"/>
+              <a:endParaRPr lang="en-US" sz="1000" u="sng" dirty="0">
                 <a:solidFill>
                   <a:prstClr val="black"/>
                 </a:solidFill>
-              </a:rPr>
-              <a:t>Private State</a:t>
-            </a:r>
-          </a:p>
-          <a:p>
-            <a:pPr algn="ctr"/>
-            <a:r>
-              <a:rPr lang="en-US" dirty="0">
-                <a:solidFill>
-                  <a:schemeClr val="tx1"/>
-                </a:solidFill>
-              </a:rPr>
-              <a:t>Collection:  </a:t>
-            </a:r>
-            <a:r>
-              <a:rPr lang="en-US" dirty="0" err="1">
-                <a:solidFill>
-                  <a:schemeClr val="tx1"/>
-                </a:solidFill>
-              </a:rPr>
-              <a:t>MarblesPrivateData</a:t>
-            </a:r>
-            <a:endParaRPr lang="en-US" dirty="0">
+              </a:endParaRPr>
+            </a:p>
+          </p:txBody>
+        </p:sp>
+        <p:cxnSp>
+          <p:nvCxnSpPr>
+            <p:cNvPr id="3" name="Straight Arrow Connector 2">
+              <a:extLst>
+                <a:ext uri="{FF2B5EF4-FFF2-40B4-BE49-F238E27FC236}">
+                  <a16:creationId xmlns:a16="http://schemas.microsoft.com/office/drawing/2014/main" id="{0933874E-0FEB-FA40-BC5B-9D044AC4C69E}"/>
+                </a:ext>
+              </a:extLst>
+            </p:cNvPr>
+            <p:cNvCxnSpPr>
+              <a:cxnSpLocks/>
+            </p:cNvCxnSpPr>
+            <p:nvPr/>
+          </p:nvCxnSpPr>
+          <p:spPr>
+            <a:xfrm>
+              <a:off x="3762703" y="3016011"/>
+              <a:ext cx="2532993" cy="0"/>
+            </a:xfrm>
+            <a:prstGeom prst="straightConnector1">
+              <a:avLst/>
+            </a:prstGeom>
+            <a:ln w="19050">
+              <a:headEnd type="triangle"/>
+              <a:tailEnd type="triangle"/>
+            </a:ln>
+          </p:spPr>
+          <p:style>
+            <a:lnRef idx="1">
+              <a:schemeClr val="dk1"/>
+            </a:lnRef>
+            <a:fillRef idx="0">
+              <a:schemeClr val="dk1"/>
+            </a:fillRef>
+            <a:effectRef idx="0">
+              <a:schemeClr val="dk1"/>
+            </a:effectRef>
+            <a:fontRef idx="minor">
+              <a:schemeClr val="tx1"/>
+            </a:fontRef>
+          </p:style>
+        </p:cxnSp>
+        <p:sp>
+          <p:nvSpPr>
+            <p:cNvPr id="8" name="TextBox 7">
+              <a:extLst>
+                <a:ext uri="{FF2B5EF4-FFF2-40B4-BE49-F238E27FC236}">
+                  <a16:creationId xmlns:a16="http://schemas.microsoft.com/office/drawing/2014/main" id="{16C61BCE-FC5C-A14B-BA1E-D53C87B655E1}"/>
+                </a:ext>
+              </a:extLst>
+            </p:cNvPr>
+            <p:cNvSpPr txBox="1"/>
+            <p:nvPr/>
+          </p:nvSpPr>
+          <p:spPr>
+            <a:xfrm>
+              <a:off x="3792631" y="2275554"/>
+              <a:ext cx="2189126" cy="646331"/>
+            </a:xfrm>
+            <a:prstGeom prst="rect">
+              <a:avLst/>
+            </a:prstGeom>
+            <a:noFill/>
+          </p:spPr>
+          <p:txBody>
+            <a:bodyPr wrap="square" rtlCol="0">
+              <a:spAutoFit/>
+            </a:bodyPr>
+            <a:lstStyle/>
+            <a:p>
+              <a:r>
+                <a:rPr lang="en-US" sz="1200" dirty="0"/>
+                <a:t>"policy": "OR('Org1MSP.member', 'Org2MSP.member')"</a:t>
+              </a:r>
+            </a:p>
+          </p:txBody>
+        </p:sp>
+        <p:sp>
+          <p:nvSpPr>
+            <p:cNvPr id="10" name="TextBox 9">
+              <a:extLst>
+                <a:ext uri="{FF2B5EF4-FFF2-40B4-BE49-F238E27FC236}">
+                  <a16:creationId xmlns:a16="http://schemas.microsoft.com/office/drawing/2014/main" id="{84E19363-8AE5-4042-923F-E98C7D2ADA02}"/>
+                </a:ext>
+              </a:extLst>
+            </p:cNvPr>
+            <p:cNvSpPr txBox="1"/>
+            <p:nvPr/>
+          </p:nvSpPr>
+          <p:spPr>
+            <a:xfrm>
+              <a:off x="3888002" y="3648094"/>
+              <a:ext cx="2063827" cy="461665"/>
+            </a:xfrm>
+            <a:prstGeom prst="rect">
+              <a:avLst/>
+            </a:prstGeom>
+            <a:noFill/>
+          </p:spPr>
+          <p:txBody>
+            <a:bodyPr wrap="square" rtlCol="0">
+              <a:spAutoFit/>
+            </a:bodyPr>
+            <a:lstStyle/>
+            <a:p>
+              <a:r>
+                <a:rPr lang="en-US" sz="1200" dirty="0"/>
+                <a:t>"policy": "OR('Org1MSP.member')"</a:t>
+              </a:r>
+            </a:p>
+          </p:txBody>
+        </p:sp>
+        <p:sp>
+          <p:nvSpPr>
+            <p:cNvPr id="22" name="Shape">
+              <a:extLst>
+                <a:ext uri="{FF2B5EF4-FFF2-40B4-BE49-F238E27FC236}">
+                  <a16:creationId xmlns:a16="http://schemas.microsoft.com/office/drawing/2014/main" id="{EC2D7E9E-6280-424E-A535-21DFD6C57095}"/>
+                </a:ext>
+              </a:extLst>
+            </p:cNvPr>
+            <p:cNvSpPr/>
+            <p:nvPr/>
+          </p:nvSpPr>
+          <p:spPr>
+            <a:xfrm>
+              <a:off x="3399938" y="5049475"/>
+              <a:ext cx="2532993" cy="1516470"/>
+            </a:xfrm>
+            <a:custGeom>
+              <a:avLst/>
+              <a:gdLst/>
+              <a:ahLst/>
+              <a:cxnLst>
+                <a:cxn ang="0">
+                  <a:pos x="wd2" y="hd2"/>
+                </a:cxn>
+                <a:cxn ang="5400000">
+                  <a:pos x="wd2" y="hd2"/>
+                </a:cxn>
+                <a:cxn ang="10800000">
+                  <a:pos x="wd2" y="hd2"/>
+                </a:cxn>
+                <a:cxn ang="16200000">
+                  <a:pos x="wd2" y="hd2"/>
+                </a:cxn>
+              </a:cxnLst>
+              <a:rect l="0" t="0" r="r" b="b"/>
+              <a:pathLst>
+                <a:path w="21600" h="19255" extrusionOk="0">
+                  <a:moveTo>
+                    <a:pt x="0" y="0"/>
+                  </a:moveTo>
+                  <a:lnTo>
+                    <a:pt x="21600" y="0"/>
+                  </a:lnTo>
+                  <a:lnTo>
+                    <a:pt x="21600" y="15641"/>
+                  </a:lnTo>
+                  <a:cubicBezTo>
+                    <a:pt x="10800" y="15641"/>
+                    <a:pt x="10800" y="21600"/>
+                    <a:pt x="0" y="18214"/>
+                  </a:cubicBezTo>
+                  <a:close/>
+                </a:path>
+              </a:pathLst>
+            </a:custGeom>
+            <a:solidFill>
+              <a:srgbClr val="4C8FCF"/>
+            </a:solidFill>
+            <a:ln w="19050" cap="flat">
               <a:solidFill>
                 <a:schemeClr val="tx1"/>
               </a:solidFill>
-            </a:endParaRPr>
-          </a:p>
-          <a:p>
-            <a:pPr algn="ctr"/>
-            <a:r>
-              <a:rPr lang="en-US" dirty="0">
-                <a:solidFill>
-                  <a:schemeClr val="tx1"/>
-                </a:solidFill>
-              </a:rPr>
-              <a:t>price</a:t>
-            </a:r>
-          </a:p>
-          <a:p>
-            <a:pPr algn="ctr"/>
-            <a:endParaRPr lang="en-US" sz="1000" u="sng" dirty="0">
+              <a:prstDash val="solid"/>
+              <a:miter lim="800000"/>
+            </a:ln>
+            <a:effectLst/>
+          </p:spPr>
+          <p:txBody>
+            <a:bodyPr wrap="square" lIns="45719" tIns="45719" rIns="45719" bIns="45719" numCol="1" anchor="ctr">
+              <a:noAutofit/>
+            </a:bodyPr>
+            <a:lstStyle/>
+            <a:p>
+              <a:pPr algn="ctr">
+                <a:defRPr>
+                  <a:solidFill>
+                    <a:srgbClr val="FFFFFF"/>
+                  </a:solidFill>
+                </a:defRPr>
+              </a:pPr>
+              <a:endParaRPr sz="800" b="1" dirty="0"/>
+            </a:p>
+          </p:txBody>
+        </p:sp>
+        <p:sp>
+          <p:nvSpPr>
+            <p:cNvPr id="23" name="Can 22">
+              <a:extLst>
+                <a:ext uri="{FF2B5EF4-FFF2-40B4-BE49-F238E27FC236}">
+                  <a16:creationId xmlns:a16="http://schemas.microsoft.com/office/drawing/2014/main" id="{A04E8678-C4DE-B742-AA8A-59307CECA83F}"/>
+                </a:ext>
+              </a:extLst>
+            </p:cNvPr>
+            <p:cNvSpPr/>
+            <p:nvPr/>
+          </p:nvSpPr>
+          <p:spPr>
+            <a:xfrm>
+              <a:off x="3568403" y="5510533"/>
+              <a:ext cx="1823403" cy="499037"/>
+            </a:xfrm>
+            <a:prstGeom prst="can">
+              <a:avLst/>
+            </a:prstGeom>
+            <a:solidFill>
+              <a:schemeClr val="bg1"/>
+            </a:solidFill>
+          </p:spPr>
+          <p:style>
+            <a:lnRef idx="1">
+              <a:schemeClr val="accent1"/>
+            </a:lnRef>
+            <a:fillRef idx="3">
+              <a:schemeClr val="accent1"/>
+            </a:fillRef>
+            <a:effectRef idx="2">
+              <a:schemeClr val="accent1"/>
+            </a:effectRef>
+            <a:fontRef idx="minor">
+              <a:schemeClr val="lt1"/>
+            </a:fontRef>
+          </p:style>
+          <p:txBody>
+            <a:bodyPr rtlCol="0" anchor="ctr"/>
+            <a:lstStyle/>
+            <a:p>
+              <a:pPr algn="ctr"/>
+              <a:r>
+                <a:rPr lang="en-US" u="sng" dirty="0">
+                  <a:solidFill>
+                    <a:prstClr val="black"/>
+                  </a:solidFill>
+                </a:rPr>
+                <a:t>Public State</a:t>
+              </a:r>
+            </a:p>
+          </p:txBody>
+        </p:sp>
+        <p:sp>
+          <p:nvSpPr>
+            <p:cNvPr id="24" name="Rounded Rectangle 23">
+              <a:extLst>
+                <a:ext uri="{FF2B5EF4-FFF2-40B4-BE49-F238E27FC236}">
+                  <a16:creationId xmlns:a16="http://schemas.microsoft.com/office/drawing/2014/main" id="{E8FE5307-ADD4-BB44-ACD9-D0698DC7CFB1}"/>
+                </a:ext>
+              </a:extLst>
+            </p:cNvPr>
+            <p:cNvSpPr/>
+            <p:nvPr/>
+          </p:nvSpPr>
+          <p:spPr>
+            <a:xfrm>
+              <a:off x="5181298" y="4809908"/>
+              <a:ext cx="741236" cy="573544"/>
+            </a:xfrm>
+            <a:prstGeom prst="roundRect">
+              <a:avLst/>
+            </a:prstGeom>
+            <a:solidFill>
+              <a:srgbClr val="4C8FCF"/>
+            </a:solidFill>
+            <a:ln w="28575" cap="flat">
               <a:solidFill>
-                <a:prstClr val="black"/>
+                <a:schemeClr val="tx1"/>
               </a:solidFill>
-            </a:endParaRPr>
-          </a:p>
-        </p:txBody>
-      </p:sp>
-      <p:sp>
-        <p:nvSpPr>
-          <p:cNvPr id="9" name="Rounded Rectangle 8">
-            <a:extLst>
-              <a:ext uri="{FF2B5EF4-FFF2-40B4-BE49-F238E27FC236}">
-                <a16:creationId xmlns:a16="http://schemas.microsoft.com/office/drawing/2014/main" id="{E84BB631-FB0B-BC47-AF70-B605E3FB7DCD}"/>
-              </a:ext>
-            </a:extLst>
-          </p:cNvPr>
-          <p:cNvSpPr/>
-          <p:nvPr/>
-        </p:nvSpPr>
-        <p:spPr>
-          <a:xfrm>
-            <a:off x="4200031" y="1032695"/>
-            <a:ext cx="1568219" cy="1463025"/>
-          </a:xfrm>
-          <a:prstGeom prst="roundRect">
-            <a:avLst/>
-          </a:prstGeom>
-          <a:solidFill>
-            <a:srgbClr val="4C8FCF"/>
-          </a:solidFill>
-          <a:ln w="28575" cap="flat">
-            <a:solidFill>
-              <a:schemeClr val="tx1"/>
-            </a:solidFill>
-            <a:prstDash val="solid"/>
-            <a:miter lim="800000"/>
-          </a:ln>
-          <a:effectLst/>
-        </p:spPr>
-        <p:txBody>
-          <a:bodyPr wrap="square" lIns="45719" tIns="45719" rIns="45719" bIns="45719" numCol="1" anchor="ctr">
-            <a:noAutofit/>
-          </a:bodyPr>
-          <a:lstStyle/>
-          <a:p>
-            <a:pPr algn="ctr"/>
-            <a:r>
-              <a:rPr lang="en-US" sz="3600" b="1" dirty="0">
-                <a:solidFill>
-                  <a:srgbClr val="FFFFFF"/>
-                </a:solidFill>
-              </a:rPr>
-              <a:t>Org1 peer</a:t>
-            </a:r>
-          </a:p>
-        </p:txBody>
-      </p:sp>
-      <p:sp>
-        <p:nvSpPr>
-          <p:cNvPr id="30" name="Shape">
-            <a:extLst>
-              <a:ext uri="{FF2B5EF4-FFF2-40B4-BE49-F238E27FC236}">
-                <a16:creationId xmlns:a16="http://schemas.microsoft.com/office/drawing/2014/main" id="{0B540093-0398-EC44-831A-E17D34724EA1}"/>
-              </a:ext>
-            </a:extLst>
-          </p:cNvPr>
-          <p:cNvSpPr/>
-          <p:nvPr/>
-        </p:nvSpPr>
-        <p:spPr>
-          <a:xfrm>
-            <a:off x="6318696" y="1897645"/>
-            <a:ext cx="4843462" cy="3859948"/>
-          </a:xfrm>
-          <a:custGeom>
-            <a:avLst/>
-            <a:gdLst/>
-            <a:ahLst/>
-            <a:cxnLst>
-              <a:cxn ang="0">
-                <a:pos x="wd2" y="hd2"/>
-              </a:cxn>
-              <a:cxn ang="5400000">
-                <a:pos x="wd2" y="hd2"/>
-              </a:cxn>
-              <a:cxn ang="10800000">
-                <a:pos x="wd2" y="hd2"/>
-              </a:cxn>
-              <a:cxn ang="16200000">
-                <a:pos x="wd2" y="hd2"/>
-              </a:cxn>
-            </a:cxnLst>
-            <a:rect l="0" t="0" r="r" b="b"/>
-            <a:pathLst>
-              <a:path w="21600" h="19255" extrusionOk="0">
-                <a:moveTo>
-                  <a:pt x="0" y="0"/>
-                </a:moveTo>
-                <a:lnTo>
-                  <a:pt x="21600" y="0"/>
-                </a:lnTo>
-                <a:lnTo>
-                  <a:pt x="21600" y="15641"/>
-                </a:lnTo>
-                <a:cubicBezTo>
-                  <a:pt x="10800" y="15641"/>
-                  <a:pt x="10800" y="21600"/>
-                  <a:pt x="0" y="18214"/>
-                </a:cubicBezTo>
-                <a:close/>
-              </a:path>
-            </a:pathLst>
-          </a:custGeom>
-          <a:solidFill>
-            <a:srgbClr val="4C8FCF"/>
-          </a:solidFill>
-          <a:ln w="19050" cap="flat">
-            <a:solidFill>
-              <a:schemeClr val="tx1"/>
-            </a:solidFill>
-            <a:prstDash val="solid"/>
-            <a:miter lim="800000"/>
-          </a:ln>
-          <a:effectLst/>
-        </p:spPr>
-        <p:txBody>
-          <a:bodyPr wrap="square" lIns="45719" tIns="45719" rIns="45719" bIns="45719" numCol="1" anchor="ctr">
-            <a:noAutofit/>
-          </a:bodyPr>
-          <a:lstStyle/>
-          <a:p>
-            <a:pPr algn="ctr">
-              <a:defRPr>
-                <a:solidFill>
-                  <a:srgbClr val="FFFFFF"/>
-                </a:solidFill>
-              </a:defRPr>
-            </a:pPr>
-            <a:endParaRPr sz="800" b="1" dirty="0"/>
-          </a:p>
-        </p:txBody>
-      </p:sp>
-      <p:sp>
-        <p:nvSpPr>
-          <p:cNvPr id="33" name="Rounded Rectangle 32">
-            <a:extLst>
-              <a:ext uri="{FF2B5EF4-FFF2-40B4-BE49-F238E27FC236}">
-                <a16:creationId xmlns:a16="http://schemas.microsoft.com/office/drawing/2014/main" id="{9D568330-ED85-654A-A281-3914D288A159}"/>
-              </a:ext>
-            </a:extLst>
-          </p:cNvPr>
-          <p:cNvSpPr/>
-          <p:nvPr/>
-        </p:nvSpPr>
-        <p:spPr>
-          <a:xfrm>
-            <a:off x="10128202" y="1166132"/>
-            <a:ext cx="1568219" cy="1463025"/>
-          </a:xfrm>
-          <a:prstGeom prst="roundRect">
-            <a:avLst/>
-          </a:prstGeom>
-          <a:solidFill>
-            <a:srgbClr val="4C8FCF"/>
-          </a:solidFill>
-          <a:ln w="28575" cap="flat">
-            <a:solidFill>
-              <a:schemeClr val="tx1"/>
-            </a:solidFill>
-            <a:prstDash val="solid"/>
-            <a:miter lim="800000"/>
-          </a:ln>
-          <a:effectLst/>
-        </p:spPr>
-        <p:txBody>
-          <a:bodyPr wrap="square" lIns="45719" tIns="45719" rIns="45719" bIns="45719" numCol="1" anchor="ctr">
-            <a:noAutofit/>
-          </a:bodyPr>
-          <a:lstStyle/>
-          <a:p>
-            <a:pPr algn="ctr"/>
-            <a:r>
-              <a:rPr lang="en-US" sz="3600" b="1" dirty="0">
-                <a:solidFill>
-                  <a:srgbClr val="FFFFFF"/>
-                </a:solidFill>
-              </a:rPr>
-              <a:t>Org2 peer</a:t>
-            </a:r>
-          </a:p>
-        </p:txBody>
-      </p:sp>
-      <p:sp>
-        <p:nvSpPr>
-          <p:cNvPr id="36" name="Can 35">
-            <a:extLst>
-              <a:ext uri="{FF2B5EF4-FFF2-40B4-BE49-F238E27FC236}">
-                <a16:creationId xmlns:a16="http://schemas.microsoft.com/office/drawing/2014/main" id="{41E049EF-171C-AC41-89E0-CD9841F8851E}"/>
-              </a:ext>
-            </a:extLst>
-          </p:cNvPr>
-          <p:cNvSpPr/>
-          <p:nvPr/>
-        </p:nvSpPr>
-        <p:spPr>
-          <a:xfrm>
-            <a:off x="6547405" y="1983053"/>
-            <a:ext cx="3065253" cy="646103"/>
-          </a:xfrm>
-          <a:prstGeom prst="can">
-            <a:avLst/>
-          </a:prstGeom>
-          <a:solidFill>
-            <a:schemeClr val="bg1"/>
-          </a:solidFill>
-        </p:spPr>
-        <p:style>
-          <a:lnRef idx="1">
-            <a:schemeClr val="accent1"/>
-          </a:lnRef>
-          <a:fillRef idx="3">
-            <a:schemeClr val="accent1"/>
-          </a:fillRef>
-          <a:effectRef idx="2">
-            <a:schemeClr val="accent1"/>
-          </a:effectRef>
-          <a:fontRef idx="minor">
-            <a:schemeClr val="lt1"/>
-          </a:fontRef>
-        </p:style>
-        <p:txBody>
-          <a:bodyPr rtlCol="0" anchor="ctr"/>
-          <a:lstStyle/>
-          <a:p>
-            <a:pPr algn="ctr"/>
-            <a:r>
-              <a:rPr lang="en-US" u="sng" dirty="0">
-                <a:solidFill>
-                  <a:prstClr val="black"/>
-                </a:solidFill>
-              </a:rPr>
-              <a:t>Public State</a:t>
-            </a:r>
-          </a:p>
-        </p:txBody>
-      </p:sp>
-      <p:sp>
-        <p:nvSpPr>
-          <p:cNvPr id="37" name="Can 36">
-            <a:extLst>
-              <a:ext uri="{FF2B5EF4-FFF2-40B4-BE49-F238E27FC236}">
-                <a16:creationId xmlns:a16="http://schemas.microsoft.com/office/drawing/2014/main" id="{2DD1FDE6-9D9E-A843-88F5-F53B2C35F595}"/>
-              </a:ext>
-            </a:extLst>
-          </p:cNvPr>
-          <p:cNvSpPr/>
-          <p:nvPr/>
-        </p:nvSpPr>
-        <p:spPr>
-          <a:xfrm>
-            <a:off x="6491174" y="2839793"/>
-            <a:ext cx="3121484" cy="1120074"/>
-          </a:xfrm>
-          <a:prstGeom prst="can">
-            <a:avLst/>
-          </a:prstGeom>
-          <a:solidFill>
-            <a:schemeClr val="bg1"/>
-          </a:solidFill>
-        </p:spPr>
-        <p:style>
-          <a:lnRef idx="1">
-            <a:schemeClr val="accent1"/>
-          </a:lnRef>
-          <a:fillRef idx="3">
-            <a:schemeClr val="accent1"/>
-          </a:fillRef>
-          <a:effectRef idx="2">
-            <a:schemeClr val="accent1"/>
-          </a:effectRef>
-          <a:fontRef idx="minor">
-            <a:schemeClr val="lt1"/>
-          </a:fontRef>
-        </p:style>
-        <p:txBody>
-          <a:bodyPr rtlCol="0" anchor="ctr"/>
-          <a:lstStyle/>
-          <a:p>
-            <a:pPr algn="ctr"/>
-            <a:r>
-              <a:rPr lang="en-US" u="sng" dirty="0">
-                <a:solidFill>
-                  <a:prstClr val="black"/>
-                </a:solidFill>
-              </a:rPr>
-              <a:t>Private State</a:t>
-            </a:r>
-          </a:p>
-          <a:p>
-            <a:pPr algn="ctr"/>
-            <a:r>
-              <a:rPr lang="en-US" dirty="0">
-                <a:solidFill>
-                  <a:prstClr val="black"/>
-                </a:solidFill>
-              </a:rPr>
-              <a:t>Collection: Marbles</a:t>
-            </a:r>
-          </a:p>
-          <a:p>
-            <a:pPr algn="ctr"/>
-            <a:r>
-              <a:rPr lang="en-US" dirty="0">
-                <a:solidFill>
-                  <a:schemeClr val="tx1"/>
-                </a:solidFill>
-              </a:rPr>
-              <a:t>name, color, size, owner</a:t>
-            </a:r>
-          </a:p>
-        </p:txBody>
-      </p:sp>
+              <a:prstDash val="solid"/>
+              <a:miter lim="800000"/>
+            </a:ln>
+            <a:effectLst/>
+          </p:spPr>
+          <p:txBody>
+            <a:bodyPr wrap="square" lIns="45719" tIns="45719" rIns="45719" bIns="45719" numCol="1" anchor="ctr">
+              <a:noAutofit/>
+            </a:bodyPr>
+            <a:lstStyle/>
+            <a:p>
+              <a:pPr algn="ctr"/>
+              <a:r>
+                <a:rPr lang="en-US" sz="1100" b="1" dirty="0">
+                  <a:solidFill>
+                    <a:srgbClr val="FFFFFF"/>
+                  </a:solidFill>
+                </a:rPr>
+                <a:t>Org3 peer</a:t>
+              </a:r>
+            </a:p>
+          </p:txBody>
+        </p:sp>
+        <p:sp>
+          <p:nvSpPr>
+            <p:cNvPr id="34" name="TextBox 33">
+              <a:extLst>
+                <a:ext uri="{FF2B5EF4-FFF2-40B4-BE49-F238E27FC236}">
+                  <a16:creationId xmlns:a16="http://schemas.microsoft.com/office/drawing/2014/main" id="{55B3F55B-F10A-C943-8EC5-83DB89FB3B96}"/>
+                </a:ext>
+              </a:extLst>
+            </p:cNvPr>
+            <p:cNvSpPr txBox="1"/>
+            <p:nvPr/>
+          </p:nvSpPr>
+          <p:spPr>
+            <a:xfrm>
+              <a:off x="9292639" y="3648094"/>
+              <a:ext cx="2063827" cy="461665"/>
+            </a:xfrm>
+            <a:prstGeom prst="rect">
+              <a:avLst/>
+            </a:prstGeom>
+            <a:noFill/>
+          </p:spPr>
+          <p:txBody>
+            <a:bodyPr wrap="square" rtlCol="0">
+              <a:spAutoFit/>
+            </a:bodyPr>
+            <a:lstStyle/>
+            <a:p>
+              <a:r>
+                <a:rPr lang="en-US" sz="1200" dirty="0"/>
+                <a:t>"policy": "OR(‘Org2MSP.member')"</a:t>
+              </a:r>
+            </a:p>
+          </p:txBody>
+        </p:sp>
+      </p:grpSp>
     </p:spTree>
     <p:extLst>
       <p:ext uri="{BB962C8B-B14F-4D97-AF65-F5344CB8AC3E}">

</xml_diff>